<commit_message>
Add functions and commenting
</commit_message>
<xml_diff>
--- a/notes/codingstandards.pptx
+++ b/notes/codingstandards.pptx
@@ -13,7 +13,9 @@
     <p:sldId id="259" r:id="rId7"/>
     <p:sldId id="261" r:id="rId8"/>
     <p:sldId id="260" r:id="rId9"/>
-    <p:sldId id="262" r:id="rId10"/>
+    <p:sldId id="266" r:id="rId10"/>
+    <p:sldId id="265" r:id="rId11"/>
+    <p:sldId id="262" r:id="rId12"/>
   </p:sldIdLst>
   <p:sldSz cx="9144000" cy="6858000" type="screen4x3"/>
   <p:notesSz cx="6858000" cy="9144000"/>
@@ -3115,6 +3117,271 @@
 </p:sld>
 </file>
 
+<file path=ppt/slides/slide10.xml><?xml version="1.0" encoding="utf-8"?>
+<p:sld xmlns:a="http://schemas.openxmlformats.org/drawingml/2006/main" xmlns:r="http://schemas.openxmlformats.org/officeDocument/2006/relationships" xmlns:p="http://schemas.openxmlformats.org/presentationml/2006/main">
+  <p:cSld>
+    <p:spTree>
+      <p:nvGrpSpPr>
+        <p:cNvPr id="1" name=""/>
+        <p:cNvGrpSpPr/>
+        <p:nvPr/>
+      </p:nvGrpSpPr>
+      <p:grpSpPr>
+        <a:xfrm>
+          <a:off x="0" y="0"/>
+          <a:ext cx="0" cy="0"/>
+          <a:chOff x="0" y="0"/>
+          <a:chExt cx="0" cy="0"/>
+        </a:xfrm>
+      </p:grpSpPr>
+      <p:sp>
+        <p:nvSpPr>
+          <p:cNvPr id="2" name="Title 1"/>
+          <p:cNvSpPr>
+            <a:spLocks noGrp="1"/>
+          </p:cNvSpPr>
+          <p:nvPr>
+            <p:ph type="title"/>
+          </p:nvPr>
+        </p:nvSpPr>
+        <p:spPr/>
+        <p:txBody>
+          <a:bodyPr/>
+          <a:lstStyle/>
+          <a:p>
+            <a:r>
+              <a:rPr lang="en-US" dirty="0" smtClean="0"/>
+              <a:t>Commenting</a:t>
+            </a:r>
+            <a:endParaRPr lang="en-US" dirty="0"/>
+          </a:p>
+        </p:txBody>
+      </p:sp>
+      <p:sp>
+        <p:nvSpPr>
+          <p:cNvPr id="3" name="Content Placeholder 2"/>
+          <p:cNvSpPr>
+            <a:spLocks noGrp="1"/>
+          </p:cNvSpPr>
+          <p:nvPr>
+            <p:ph idx="1"/>
+          </p:nvPr>
+        </p:nvSpPr>
+        <p:spPr/>
+        <p:txBody>
+          <a:bodyPr/>
+          <a:lstStyle/>
+          <a:p>
+            <a:r>
+              <a:rPr lang="en-US" dirty="0" smtClean="0"/>
+              <a:t>Commenting your code is good in general</a:t>
+            </a:r>
+          </a:p>
+          <a:p>
+            <a:r>
+              <a:rPr lang="en-US" dirty="0" smtClean="0"/>
+              <a:t>There </a:t>
+            </a:r>
+            <a:r>
+              <a:rPr lang="en-US" i="1" dirty="0" smtClean="0"/>
+              <a:t>is</a:t>
+            </a:r>
+            <a:r>
+              <a:rPr lang="en-US" dirty="0" smtClean="0"/>
+              <a:t> such a thing as over-commenting</a:t>
+            </a:r>
+          </a:p>
+          <a:p>
+            <a:r>
+              <a:rPr lang="en-US" dirty="0" smtClean="0"/>
+              <a:t>Never try </a:t>
+            </a:r>
+            <a:r>
+              <a:rPr lang="en-US" dirty="0"/>
+              <a:t>to explain </a:t>
+            </a:r>
+            <a:r>
+              <a:rPr lang="en-US" dirty="0" smtClean="0"/>
+              <a:t>how </a:t>
+            </a:r>
+            <a:r>
+              <a:rPr lang="en-US" dirty="0"/>
+              <a:t>your code works in a </a:t>
+            </a:r>
+            <a:r>
+              <a:rPr lang="en-US" dirty="0" smtClean="0"/>
+              <a:t>comment</a:t>
+            </a:r>
+            <a:endParaRPr lang="en-US" dirty="0"/>
+          </a:p>
+          <a:p>
+            <a:r>
+              <a:rPr lang="en-US" dirty="0"/>
+              <a:t>W</a:t>
+            </a:r>
+            <a:r>
+              <a:rPr lang="en-US" dirty="0" smtClean="0"/>
+              <a:t>rite </a:t>
+            </a:r>
+            <a:r>
+              <a:rPr lang="en-US" dirty="0"/>
+              <a:t>the code so that the </a:t>
+            </a:r>
+            <a:r>
+              <a:rPr lang="en-US" dirty="0" smtClean="0"/>
+              <a:t>it is obvious how it works</a:t>
+            </a:r>
+          </a:p>
+          <a:p>
+            <a:r>
+              <a:rPr lang="en-US" dirty="0" smtClean="0"/>
+              <a:t>Comments should explain </a:t>
+            </a:r>
+            <a:r>
+              <a:rPr lang="en-US" i="1" dirty="0" smtClean="0"/>
+              <a:t>what</a:t>
+            </a:r>
+            <a:r>
+              <a:rPr lang="en-US" dirty="0" smtClean="0"/>
+              <a:t> the code does, not how it works</a:t>
+            </a:r>
+            <a:endParaRPr lang="en-US" dirty="0"/>
+          </a:p>
+        </p:txBody>
+      </p:sp>
+    </p:spTree>
+    <p:extLst>
+      <p:ext uri="{BB962C8B-B14F-4D97-AF65-F5344CB8AC3E}">
+        <p14:creationId xmlns:p14="http://schemas.microsoft.com/office/powerpoint/2010/main" val="2873345029"/>
+      </p:ext>
+    </p:extLst>
+  </p:cSld>
+  <p:clrMapOvr>
+    <a:masterClrMapping/>
+  </p:clrMapOvr>
+</p:sld>
+</file>
+
+<file path=ppt/slides/slide11.xml><?xml version="1.0" encoding="utf-8"?>
+<p:sld xmlns:a="http://schemas.openxmlformats.org/drawingml/2006/main" xmlns:r="http://schemas.openxmlformats.org/officeDocument/2006/relationships" xmlns:p="http://schemas.openxmlformats.org/presentationml/2006/main">
+  <p:cSld>
+    <p:spTree>
+      <p:nvGrpSpPr>
+        <p:cNvPr id="1" name=""/>
+        <p:cNvGrpSpPr/>
+        <p:nvPr/>
+      </p:nvGrpSpPr>
+      <p:grpSpPr>
+        <a:xfrm>
+          <a:off x="0" y="0"/>
+          <a:ext cx="0" cy="0"/>
+          <a:chOff x="0" y="0"/>
+          <a:chExt cx="0" cy="0"/>
+        </a:xfrm>
+      </p:grpSpPr>
+      <p:sp>
+        <p:nvSpPr>
+          <p:cNvPr id="2" name="Title 1"/>
+          <p:cNvSpPr>
+            <a:spLocks noGrp="1"/>
+          </p:cNvSpPr>
+          <p:nvPr>
+            <p:ph type="title"/>
+          </p:nvPr>
+        </p:nvSpPr>
+        <p:spPr/>
+        <p:txBody>
+          <a:bodyPr/>
+          <a:lstStyle/>
+          <a:p>
+            <a:r>
+              <a:rPr lang="en-US" dirty="0" smtClean="0"/>
+              <a:t>Summary</a:t>
+            </a:r>
+            <a:endParaRPr lang="en-US" dirty="0"/>
+          </a:p>
+        </p:txBody>
+      </p:sp>
+      <p:sp>
+        <p:nvSpPr>
+          <p:cNvPr id="3" name="Content Placeholder 2"/>
+          <p:cNvSpPr>
+            <a:spLocks noGrp="1"/>
+          </p:cNvSpPr>
+          <p:nvPr>
+            <p:ph idx="1"/>
+          </p:nvPr>
+        </p:nvSpPr>
+        <p:spPr/>
+        <p:txBody>
+          <a:bodyPr>
+            <a:normAutofit fontScale="92500" lnSpcReduction="20000"/>
+          </a:bodyPr>
+          <a:lstStyle/>
+          <a:p>
+            <a:r>
+              <a:rPr lang="en-US" dirty="0"/>
+              <a:t>Indenting improves readability</a:t>
+            </a:r>
+          </a:p>
+          <a:p>
+            <a:r>
+              <a:rPr lang="en-US" dirty="0"/>
+              <a:t>Fixing line length (80 columns) prevents lots of nesting and very long functions</a:t>
+            </a:r>
+          </a:p>
+          <a:p>
+            <a:r>
+              <a:rPr lang="en-US" dirty="0"/>
+              <a:t>Indents of 4 spaces at minimum; 8 spaces </a:t>
+            </a:r>
+            <a:r>
+              <a:rPr lang="en-US" dirty="0" smtClean="0"/>
+              <a:t>ideal</a:t>
+            </a:r>
+          </a:p>
+          <a:p>
+            <a:r>
+              <a:rPr lang="en-US" dirty="0" smtClean="0"/>
+              <a:t>BUT: Always follow the established style of an existing project. Don’t make trouble for the maintainer!</a:t>
+            </a:r>
+          </a:p>
+          <a:p>
+            <a:r>
+              <a:rPr lang="en-US" dirty="0" smtClean="0"/>
+              <a:t>Functions should do one </a:t>
+            </a:r>
+            <a:r>
+              <a:rPr lang="en-US" smtClean="0"/>
+              <a:t>thing well</a:t>
+            </a:r>
+            <a:endParaRPr lang="en-US" dirty="0" smtClean="0"/>
+          </a:p>
+          <a:p>
+            <a:r>
+              <a:rPr lang="en-US" dirty="0" smtClean="0"/>
+              <a:t>Comments should be as simple as possible but no simpler</a:t>
+            </a:r>
+            <a:endParaRPr lang="en-US" dirty="0"/>
+          </a:p>
+          <a:p>
+            <a:endParaRPr lang="en-US" dirty="0"/>
+          </a:p>
+        </p:txBody>
+      </p:sp>
+    </p:spTree>
+    <p:extLst>
+      <p:ext uri="{BB962C8B-B14F-4D97-AF65-F5344CB8AC3E}">
+        <p14:creationId xmlns:p14="http://schemas.microsoft.com/office/powerpoint/2010/main" val="3359104742"/>
+      </p:ext>
+    </p:extLst>
+  </p:cSld>
+  <p:clrMapOvr>
+    <a:masterClrMapping/>
+  </p:clrMapOvr>
+</p:sld>
+</file>
+
 <file path=ppt/slides/slide2.xml><?xml version="1.0" encoding="utf-8"?>
 <p:sld xmlns:a="http://schemas.openxmlformats.org/drawingml/2006/main" xmlns:r="http://schemas.openxmlformats.org/officeDocument/2006/relationships" xmlns:p="http://schemas.openxmlformats.org/presentationml/2006/main">
   <p:cSld>
@@ -3270,7 +3537,7 @@
         </p:spPr>
         <p:txBody>
           <a:bodyPr>
-            <a:normAutofit fontScale="92500" lnSpcReduction="20000"/>
+            <a:normAutofit fontScale="92500" lnSpcReduction="10000"/>
           </a:bodyPr>
           <a:lstStyle/>
           <a:p>
@@ -3304,8 +3571,13 @@
           <a:p>
             <a:r>
               <a:rPr lang="en-US" dirty="0"/>
-              <a:t>Indent your code; use large enough indent so that old people like me can see it; I use 8 spaces (i.e. 2 tabs)</a:t>
-            </a:r>
+              <a:t>Indent your code; use large enough indent so that old people like me can see it; I use 8 </a:t>
+            </a:r>
+            <a:r>
+              <a:rPr lang="en-US" dirty="0" smtClean="0"/>
+              <a:t>spaces</a:t>
+            </a:r>
+            <a:endParaRPr lang="en-US" dirty="0"/>
           </a:p>
           <a:p>
             <a:r>
@@ -4031,9 +4303,10 @@
           <a:lstStyle/>
           <a:p>
             <a:r>
-              <a:rPr lang="en-US"/>
-              <a:t>Indenting</a:t>
-            </a:r>
+              <a:rPr lang="en-US" dirty="0" smtClean="0"/>
+              <a:t>Functions</a:t>
+            </a:r>
+            <a:endParaRPr lang="en-US" dirty="0"/>
           </a:p>
         </p:txBody>
       </p:sp>
@@ -4053,38 +4326,33 @@
           <a:lstStyle/>
           <a:p>
             <a:r>
-              <a:rPr lang="en-US" dirty="0"/>
-              <a:t>Indenting improves readability</a:t>
-            </a:r>
-          </a:p>
-          <a:p>
-            <a:r>
-              <a:rPr lang="en-US" dirty="0"/>
-              <a:t>Fixing line length (80 columns) prevents lots of nesting and very long functions</a:t>
-            </a:r>
-          </a:p>
-          <a:p>
-            <a:r>
-              <a:rPr lang="en-US" dirty="0"/>
-              <a:t>Indents of 4 spaces at minimum; 8 spaces </a:t>
-            </a:r>
-            <a:r>
               <a:rPr lang="en-US" dirty="0" smtClean="0"/>
-              <a:t>ideal</a:t>
+              <a:t>Functions should do one thing well</a:t>
             </a:r>
           </a:p>
           <a:p>
             <a:r>
               <a:rPr lang="en-US" dirty="0" smtClean="0"/>
-              <a:t>BUT: Always follow the established style of an existing project. Don’t make trouble for </a:t>
-            </a:r>
-            <a:r>
-              <a:rPr lang="en-US" smtClean="0"/>
-              <a:t>the maintainer!</a:t>
-            </a:r>
-            <a:endParaRPr lang="en-US"/>
-          </a:p>
-          <a:p>
+              <a:t>~1 screen full of text</a:t>
+            </a:r>
+          </a:p>
+          <a:p>
+            <a:r>
+              <a:rPr lang="en-US" dirty="0" smtClean="0"/>
+              <a:t>5-10 local variables</a:t>
+            </a:r>
+          </a:p>
+          <a:p>
+            <a:r>
+              <a:rPr lang="en-US" dirty="0" smtClean="0"/>
+              <a:t>Informative but succinct names</a:t>
+            </a:r>
+          </a:p>
+          <a:p>
+            <a:r>
+              <a:rPr lang="en-US" dirty="0" smtClean="0"/>
+              <a:t>If functions get long break them up into helper functions</a:t>
+            </a:r>
             <a:endParaRPr lang="en-US" dirty="0"/>
           </a:p>
         </p:txBody>
@@ -4092,7 +4360,7 @@
     </p:spTree>
     <p:extLst>
       <p:ext uri="{BB962C8B-B14F-4D97-AF65-F5344CB8AC3E}">
-        <p14:creationId xmlns:p14="http://schemas.microsoft.com/office/powerpoint/2010/main" val="3359104742"/>
+        <p14:creationId xmlns:p14="http://schemas.microsoft.com/office/powerpoint/2010/main" val="2011582481"/>
       </p:ext>
     </p:extLst>
   </p:cSld>

</xml_diff>